<commit_message>
last data + november presentation
</commit_message>
<xml_diff>
--- a/Jasper Files/Presentations/2023 November presentation.pptx
+++ b/Jasper Files/Presentations/2023 November presentation.pptx
@@ -222,7 +222,7 @@
           <a:p>
             <a:fld id="{8F591CCF-F6FD-734B-854A-5BC033593B1E}" type="datetimeFigureOut">
               <a:rPr lang="nl-NL" smtClean="0"/>
-              <a:t>10-12-2023</a:t>
+              <a:t>11-12-2023</a:t>
             </a:fld>
             <a:endParaRPr lang="nl-NL"/>
           </a:p>
@@ -387,7 +387,7 @@
           <a:p>
             <a:fld id="{23C66214-DB21-4647-B5DA-0D17CA592867}" type="datetimeFigureOut">
               <a:rPr lang="nl-NL" smtClean="0"/>
-              <a:t>10-12-2023</a:t>
+              <a:t>11-12-2023</a:t>
             </a:fld>
             <a:endParaRPr lang="nl-NL"/>
           </a:p>
@@ -2282,7 +2282,7 @@
           <a:p>
             <a:fld id="{E4F61F44-893E-4F7F-BADF-A5F524D73BC2}" type="datetime1">
               <a:rPr lang="nl-BE" smtClean="0"/>
-              <a:t>10/12/2023</a:t>
+              <a:t>11/12/2023</a:t>
             </a:fld>
             <a:endParaRPr lang="nl-NL"/>
           </a:p>
@@ -2566,7 +2566,7 @@
           <a:p>
             <a:fld id="{6E723544-E738-4425-87D5-331AB5332869}" type="datetime1">
               <a:rPr lang="nl-BE" smtClean="0"/>
-              <a:t>10/12/2023</a:t>
+              <a:t>11/12/2023</a:t>
             </a:fld>
             <a:endParaRPr lang="nl-NL"/>
           </a:p>
@@ -2897,7 +2897,7 @@
           <a:p>
             <a:fld id="{434BF39D-E7F8-4E42-8744-FB2C72A81DA6}" type="datetime1">
               <a:rPr lang="nl-BE" smtClean="0"/>
-              <a:t>10/12/2023</a:t>
+              <a:t>11/12/2023</a:t>
             </a:fld>
             <a:endParaRPr lang="nl-NL"/>
           </a:p>
@@ -3218,7 +3218,7 @@
           <a:p>
             <a:fld id="{BD4500A5-46FC-4EC5-8F2C-C380D4E5A268}" type="datetime1">
               <a:rPr lang="nl-BE" smtClean="0"/>
-              <a:t>10/12/2023</a:t>
+              <a:t>11/12/2023</a:t>
             </a:fld>
             <a:endParaRPr lang="nl-NL" dirty="0"/>
           </a:p>
@@ -3540,7 +3540,7 @@
           <a:p>
             <a:fld id="{14CE7F8C-B9D2-4149-87B2-80953F7F09E1}" type="datetime1">
               <a:rPr lang="nl-BE" smtClean="0"/>
-              <a:t>10/12/2023</a:t>
+              <a:t>11/12/2023</a:t>
             </a:fld>
             <a:endParaRPr lang="nl-NL" dirty="0"/>
           </a:p>
@@ -3683,7 +3683,7 @@
           <a:p>
             <a:fld id="{67ADE489-251F-4688-A491-3F7A0B06554F}" type="datetime1">
               <a:rPr lang="nl-BE" smtClean="0"/>
-              <a:t>10/12/2023</a:t>
+              <a:t>11/12/2023</a:t>
             </a:fld>
             <a:endParaRPr lang="nl-NL"/>
           </a:p>
@@ -4168,7 +4168,7 @@
           <a:p>
             <a:fld id="{ACBB421E-243D-4C33-83C7-F4F36278532E}" type="datetime1">
               <a:rPr lang="nl-BE" smtClean="0"/>
-              <a:t>10/12/2023</a:t>
+              <a:t>11/12/2023</a:t>
             </a:fld>
             <a:endParaRPr lang="nl-NL" dirty="0"/>
           </a:p>
@@ -4290,7 +4290,7 @@
           <a:p>
             <a:fld id="{4CCC814D-44AA-4A84-A762-33A2C2E8474C}" type="datetime1">
               <a:rPr lang="nl-BE" smtClean="0"/>
-              <a:t>10/12/2023</a:t>
+              <a:t>11/12/2023</a:t>
             </a:fld>
             <a:endParaRPr lang="nl-NL"/>
           </a:p>
@@ -4412,7 +4412,7 @@
           <a:p>
             <a:fld id="{6E543FF9-E807-4251-94B8-EC6F45F70271}" type="datetime1">
               <a:rPr lang="nl-BE" smtClean="0"/>
-              <a:t>10/12/2023</a:t>
+              <a:t>11/12/2023</a:t>
             </a:fld>
             <a:endParaRPr lang="nl-NL"/>
           </a:p>
@@ -4595,7 +4595,7 @@
           <a:p>
             <a:fld id="{F89D940D-F13E-46A3-8182-03C3BDDE959F}" type="datetime1">
               <a:rPr lang="nl-BE" smtClean="0"/>
-              <a:t>10/12/2023</a:t>
+              <a:t>11/12/2023</a:t>
             </a:fld>
             <a:endParaRPr lang="nl-NL" dirty="0"/>
           </a:p>
@@ -4880,7 +4880,7 @@
           <a:p>
             <a:fld id="{E7557D33-DAFF-4435-8960-E822FF6727AE}" type="datetime1">
               <a:rPr lang="nl-BE" smtClean="0"/>
-              <a:t>10/12/2023</a:t>
+              <a:t>11/12/2023</a:t>
             </a:fld>
             <a:endParaRPr lang="nl-NL" dirty="0"/>
           </a:p>
@@ -5521,7 +5521,7 @@
           <a:p>
             <a:fld id="{B522B1A5-B970-4E51-AB3E-5CE4834A67CB}" type="datetime1">
               <a:rPr lang="nl-BE" smtClean="0"/>
-              <a:t>10/12/2023</a:t>
+              <a:t>11/12/2023</a:t>
             </a:fld>
             <a:endParaRPr lang="nl-NL" dirty="0"/>
           </a:p>
@@ -7579,6 +7579,66 @@
           <a:xfrm>
             <a:off x="899999" y="3497867"/>
             <a:ext cx="7817277" cy="3315701"/>
+          </a:xfrm>
+          <a:prstGeom prst="rect">
+            <a:avLst/>
+          </a:prstGeom>
+        </p:spPr>
+      </p:pic>
+      <p:pic>
+        <p:nvPicPr>
+          <p:cNvPr id="5" name="Picture 4">
+            <a:extLst>
+              <a:ext uri="{FF2B5EF4-FFF2-40B4-BE49-F238E27FC236}">
+                <a16:creationId xmlns:a16="http://schemas.microsoft.com/office/drawing/2014/main" id="{04394A11-F6B8-3011-C51A-5179501F20D2}"/>
+              </a:ext>
+            </a:extLst>
+          </p:cNvPr>
+          <p:cNvPicPr>
+            <a:picLocks noChangeAspect="1"/>
+          </p:cNvPicPr>
+          <p:nvPr/>
+        </p:nvPicPr>
+        <p:blipFill>
+          <a:blip r:embed="rId6"/>
+          <a:stretch>
+            <a:fillRect/>
+          </a:stretch>
+        </p:blipFill>
+        <p:spPr>
+          <a:xfrm>
+            <a:off x="3950208" y="96677"/>
+            <a:ext cx="8241792" cy="3492879"/>
+          </a:xfrm>
+          <a:prstGeom prst="rect">
+            <a:avLst/>
+          </a:prstGeom>
+        </p:spPr>
+      </p:pic>
+      <p:pic>
+        <p:nvPicPr>
+          <p:cNvPr id="8" name="Picture 7">
+            <a:extLst>
+              <a:ext uri="{FF2B5EF4-FFF2-40B4-BE49-F238E27FC236}">
+                <a16:creationId xmlns:a16="http://schemas.microsoft.com/office/drawing/2014/main" id="{58966DA2-0A82-B18F-D3E8-E600BD20FFD8}"/>
+              </a:ext>
+            </a:extLst>
+          </p:cNvPr>
+          <p:cNvPicPr>
+            <a:picLocks noChangeAspect="1"/>
+          </p:cNvPicPr>
+          <p:nvPr/>
+        </p:nvPicPr>
+        <p:blipFill>
+          <a:blip r:embed="rId7"/>
+          <a:stretch>
+            <a:fillRect/>
+          </a:stretch>
+        </p:blipFill>
+        <p:spPr>
+          <a:xfrm>
+            <a:off x="899999" y="3461297"/>
+            <a:ext cx="7914817" cy="3352271"/>
           </a:xfrm>
           <a:prstGeom prst="rect">
             <a:avLst/>

</xml_diff>